<commit_message>
Ajout du cahier des charges - arborescence - périmétre fonctionel
</commit_message>
<xml_diff>
--- a/Documentation/01c_Perimetre_fonctionnel.pptx
+++ b/Documentation/01c_Perimetre_fonctionnel.pptx
@@ -112,6 +112,14 @@
 </p:presentation>
 </file>
 
+<file path=ppt/revisionInfo.xml><?xml version="1.0" encoding="utf-8"?>
+<p1510:revInfo xmlns:a="http://schemas.openxmlformats.org/drawingml/2006/main" xmlns:r="http://schemas.openxmlformats.org/officeDocument/2006/relationships" xmlns:p1510="http://schemas.microsoft.com/office/powerpoint/2015/10/main">
+  <p1510:revLst>
+    <p1510:client id="{EC0276A3-A7F7-4812-A776-C1E1B997C97E}" v="2" dt="2020-01-06T16:24:42.577"/>
+  </p1510:revLst>
+</p1510:revInfo>
+</file>
+
 <file path=ppt/changesInfos/changesInfo1.xml><?xml version="1.0" encoding="utf-8"?>
 <pc:chgInfo xmlns:a="http://schemas.openxmlformats.org/drawingml/2006/main" xmlns:r="http://schemas.openxmlformats.org/officeDocument/2006/relationships" xmlns:ac="http://schemas.microsoft.com/office/drawing/2013/main/command" xmlns:pc="http://schemas.microsoft.com/office/powerpoint/2013/main/command">
   <pc:docChgLst>
@@ -447,6 +455,190 @@
             <ac:spMk id="17" creationId="{01CA3DC7-1833-461A-B5F0-E55D0A317B4C}"/>
           </ac:spMkLst>
         </pc:spChg>
+      </pc:sldChg>
+    </pc:docChg>
+  </pc:docChgLst>
+  <pc:docChgLst>
+    <pc:chgData name="Vivian G" userId="217fb073e6d8a319" providerId="LiveId" clId="{EC0276A3-A7F7-4812-A776-C1E1B997C97E}"/>
+    <pc:docChg chg="undo custSel modSld">
+      <pc:chgData name="Vivian G" userId="217fb073e6d8a319" providerId="LiveId" clId="{EC0276A3-A7F7-4812-A776-C1E1B997C97E}" dt="2020-01-06T16:26:26.220" v="459" actId="14100"/>
+      <pc:docMkLst>
+        <pc:docMk/>
+      </pc:docMkLst>
+      <pc:sldChg chg="addSp delSp modSp">
+        <pc:chgData name="Vivian G" userId="217fb073e6d8a319" providerId="LiveId" clId="{EC0276A3-A7F7-4812-A776-C1E1B997C97E}" dt="2020-01-06T16:26:26.220" v="459" actId="14100"/>
+        <pc:sldMkLst>
+          <pc:docMk/>
+          <pc:sldMk cId="2940290616" sldId="256"/>
+        </pc:sldMkLst>
+        <pc:spChg chg="mod">
+          <ac:chgData name="Vivian G" userId="217fb073e6d8a319" providerId="LiveId" clId="{EC0276A3-A7F7-4812-A776-C1E1B997C97E}" dt="2020-01-06T12:41:10.999" v="47" actId="20577"/>
+          <ac:spMkLst>
+            <pc:docMk/>
+            <pc:sldMk cId="2940290616" sldId="256"/>
+            <ac:spMk id="10" creationId="{997601B0-F899-41D8-9E26-D55F9E560DC1}"/>
+          </ac:spMkLst>
+        </pc:spChg>
+        <pc:spChg chg="mod">
+          <ac:chgData name="Vivian G" userId="217fb073e6d8a319" providerId="LiveId" clId="{EC0276A3-A7F7-4812-A776-C1E1B997C97E}" dt="2020-01-06T12:46:37.652" v="141" actId="20577"/>
+          <ac:spMkLst>
+            <pc:docMk/>
+            <pc:sldMk cId="2940290616" sldId="256"/>
+            <ac:spMk id="11" creationId="{65B8BE33-221C-49CD-8AAE-D38791ADCD04}"/>
+          </ac:spMkLst>
+        </pc:spChg>
+        <pc:spChg chg="mod">
+          <ac:chgData name="Vivian G" userId="217fb073e6d8a319" providerId="LiveId" clId="{EC0276A3-A7F7-4812-A776-C1E1B997C97E}" dt="2020-01-06T16:26:02.762" v="454" actId="1076"/>
+          <ac:spMkLst>
+            <pc:docMk/>
+            <pc:sldMk cId="2940290616" sldId="256"/>
+            <ac:spMk id="12" creationId="{9D36112C-A0DC-4EAA-A64A-CEE82689E9AE}"/>
+          </ac:spMkLst>
+        </pc:spChg>
+        <pc:spChg chg="mod">
+          <ac:chgData name="Vivian G" userId="217fb073e6d8a319" providerId="LiveId" clId="{EC0276A3-A7F7-4812-A776-C1E1B997C97E}" dt="2020-01-06T16:23:03.453" v="260" actId="20577"/>
+          <ac:spMkLst>
+            <pc:docMk/>
+            <pc:sldMk cId="2940290616" sldId="256"/>
+            <ac:spMk id="15" creationId="{6E752954-5E73-4C35-90BD-F03CD21E6189}"/>
+          </ac:spMkLst>
+        </pc:spChg>
+        <pc:spChg chg="mod">
+          <ac:chgData name="Vivian G" userId="217fb073e6d8a319" providerId="LiveId" clId="{EC0276A3-A7F7-4812-A776-C1E1B997C97E}" dt="2020-01-06T12:42:11.876" v="88" actId="20577"/>
+          <ac:spMkLst>
+            <pc:docMk/>
+            <pc:sldMk cId="2940290616" sldId="256"/>
+            <ac:spMk id="18" creationId="{8F78E371-6372-4354-8EAB-EBFB999C226C}"/>
+          </ac:spMkLst>
+        </pc:spChg>
+        <pc:spChg chg="mod">
+          <ac:chgData name="Vivian G" userId="217fb073e6d8a319" providerId="LiveId" clId="{EC0276A3-A7F7-4812-A776-C1E1B997C97E}" dt="2020-01-06T16:26:09.018" v="455" actId="1076"/>
+          <ac:spMkLst>
+            <pc:docMk/>
+            <pc:sldMk cId="2940290616" sldId="256"/>
+            <ac:spMk id="19" creationId="{325A2087-E9E7-404A-B2F7-4FE3C7772EE0}"/>
+          </ac:spMkLst>
+        </pc:spChg>
+        <pc:spChg chg="del">
+          <ac:chgData name="Vivian G" userId="217fb073e6d8a319" providerId="LiveId" clId="{EC0276A3-A7F7-4812-A776-C1E1B997C97E}" dt="2020-01-06T12:48:53.057" v="244" actId="478"/>
+          <ac:spMkLst>
+            <pc:docMk/>
+            <pc:sldMk cId="2940290616" sldId="256"/>
+            <ac:spMk id="20" creationId="{3B91AB16-7614-4C9E-B3B5-B93E98A5FF86}"/>
+          </ac:spMkLst>
+        </pc:spChg>
+        <pc:spChg chg="mod">
+          <ac:chgData name="Vivian G" userId="217fb073e6d8a319" providerId="LiveId" clId="{EC0276A3-A7F7-4812-A776-C1E1B997C97E}" dt="2020-01-06T16:25:59.529" v="453" actId="1076"/>
+          <ac:spMkLst>
+            <pc:docMk/>
+            <pc:sldMk cId="2940290616" sldId="256"/>
+            <ac:spMk id="21" creationId="{10BC3F28-CABE-47CA-9D71-234893D38DF0}"/>
+          </ac:spMkLst>
+        </pc:spChg>
+        <pc:spChg chg="mod">
+          <ac:chgData name="Vivian G" userId="217fb073e6d8a319" providerId="LiveId" clId="{EC0276A3-A7F7-4812-A776-C1E1B997C97E}" dt="2020-01-06T16:25:53.117" v="452" actId="1076"/>
+          <ac:spMkLst>
+            <pc:docMk/>
+            <pc:sldMk cId="2940290616" sldId="256"/>
+            <ac:spMk id="22" creationId="{E885E566-7C21-4B12-B384-17740978F117}"/>
+          </ac:spMkLst>
+        </pc:spChg>
+        <pc:spChg chg="mod">
+          <ac:chgData name="Vivian G" userId="217fb073e6d8a319" providerId="LiveId" clId="{EC0276A3-A7F7-4812-A776-C1E1B997C97E}" dt="2020-01-06T16:23:58.742" v="311" actId="1076"/>
+          <ac:spMkLst>
+            <pc:docMk/>
+            <pc:sldMk cId="2940290616" sldId="256"/>
+            <ac:spMk id="23" creationId="{DCB73E36-9E1E-46E4-9554-52489A387F16}"/>
+          </ac:spMkLst>
+        </pc:spChg>
+        <pc:spChg chg="add mod">
+          <ac:chgData name="Vivian G" userId="217fb073e6d8a319" providerId="LiveId" clId="{EC0276A3-A7F7-4812-A776-C1E1B997C97E}" dt="2020-01-06T16:26:16.927" v="457" actId="1076"/>
+          <ac:spMkLst>
+            <pc:docMk/>
+            <pc:sldMk cId="2940290616" sldId="256"/>
+            <ac:spMk id="33" creationId="{E5429D25-665E-48EC-9029-80AA2AB18619}"/>
+          </ac:spMkLst>
+        </pc:spChg>
+        <pc:cxnChg chg="mod">
+          <ac:chgData name="Vivian G" userId="217fb073e6d8a319" providerId="LiveId" clId="{EC0276A3-A7F7-4812-A776-C1E1B997C97E}" dt="2020-01-06T12:41:03.581" v="38" actId="1076"/>
+          <ac:cxnSpMkLst>
+            <pc:docMk/>
+            <pc:sldMk cId="2940290616" sldId="256"/>
+            <ac:cxnSpMk id="25" creationId="{0ED895BA-70F9-4ECA-8ECE-294EA8765669}"/>
+          </ac:cxnSpMkLst>
+        </pc:cxnChg>
+        <pc:cxnChg chg="add mod">
+          <ac:chgData name="Vivian G" userId="217fb073e6d8a319" providerId="LiveId" clId="{EC0276A3-A7F7-4812-A776-C1E1B997C97E}" dt="2020-01-06T16:26:19.236" v="458" actId="14100"/>
+          <ac:cxnSpMkLst>
+            <pc:docMk/>
+            <pc:sldMk cId="2940290616" sldId="256"/>
+            <ac:cxnSpMk id="31" creationId="{4AF9F0DE-AB09-485D-B176-3EABE0C0E908}"/>
+          </ac:cxnSpMkLst>
+        </pc:cxnChg>
+        <pc:cxnChg chg="mod">
+          <ac:chgData name="Vivian G" userId="217fb073e6d8a319" providerId="LiveId" clId="{EC0276A3-A7F7-4812-A776-C1E1B997C97E}" dt="2020-01-06T12:41:03.581" v="38" actId="1076"/>
+          <ac:cxnSpMkLst>
+            <pc:docMk/>
+            <pc:sldMk cId="2940290616" sldId="256"/>
+            <ac:cxnSpMk id="32" creationId="{0B9FE96F-0A58-4A0B-8B8A-99BC809DA38F}"/>
+          </ac:cxnSpMkLst>
+        </pc:cxnChg>
+        <pc:cxnChg chg="mod">
+          <ac:chgData name="Vivian G" userId="217fb073e6d8a319" providerId="LiveId" clId="{EC0276A3-A7F7-4812-A776-C1E1B997C97E}" dt="2020-01-06T12:41:03.581" v="38" actId="1076"/>
+          <ac:cxnSpMkLst>
+            <pc:docMk/>
+            <pc:sldMk cId="2940290616" sldId="256"/>
+            <ac:cxnSpMk id="36" creationId="{5297B0ED-BEAC-4862-BAED-B9BE456C819C}"/>
+          </ac:cxnSpMkLst>
+        </pc:cxnChg>
+        <pc:cxnChg chg="mod">
+          <ac:chgData name="Vivian G" userId="217fb073e6d8a319" providerId="LiveId" clId="{EC0276A3-A7F7-4812-A776-C1E1B997C97E}" dt="2020-01-06T16:23:58.742" v="311" actId="1076"/>
+          <ac:cxnSpMkLst>
+            <pc:docMk/>
+            <pc:sldMk cId="2940290616" sldId="256"/>
+            <ac:cxnSpMk id="44" creationId="{45D76D25-1681-43DE-8898-9E5EF114B305}"/>
+          </ac:cxnSpMkLst>
+        </pc:cxnChg>
+        <pc:cxnChg chg="mod">
+          <ac:chgData name="Vivian G" userId="217fb073e6d8a319" providerId="LiveId" clId="{EC0276A3-A7F7-4812-A776-C1E1B997C97E}" dt="2020-01-06T16:26:26.220" v="459" actId="14100"/>
+          <ac:cxnSpMkLst>
+            <pc:docMk/>
+            <pc:sldMk cId="2940290616" sldId="256"/>
+            <ac:cxnSpMk id="46" creationId="{2E0F081D-2052-485E-A585-1CD4D731B9AC}"/>
+          </ac:cxnSpMkLst>
+        </pc:cxnChg>
+        <pc:cxnChg chg="del mod">
+          <ac:chgData name="Vivian G" userId="217fb073e6d8a319" providerId="LiveId" clId="{EC0276A3-A7F7-4812-A776-C1E1B997C97E}" dt="2020-01-06T12:48:53.860" v="245" actId="478"/>
+          <ac:cxnSpMkLst>
+            <pc:docMk/>
+            <pc:sldMk cId="2940290616" sldId="256"/>
+            <ac:cxnSpMk id="48" creationId="{2E28E69B-67AF-4B1E-8157-F14218C06D9B}"/>
+          </ac:cxnSpMkLst>
+        </pc:cxnChg>
+        <pc:cxnChg chg="mod">
+          <ac:chgData name="Vivian G" userId="217fb073e6d8a319" providerId="LiveId" clId="{EC0276A3-A7F7-4812-A776-C1E1B997C97E}" dt="2020-01-06T16:26:02.762" v="454" actId="1076"/>
+          <ac:cxnSpMkLst>
+            <pc:docMk/>
+            <pc:sldMk cId="2940290616" sldId="256"/>
+            <ac:cxnSpMk id="50" creationId="{98427187-9A35-4E0E-99D6-401AF8F12497}"/>
+          </ac:cxnSpMkLst>
+        </pc:cxnChg>
+        <pc:cxnChg chg="mod">
+          <ac:chgData name="Vivian G" userId="217fb073e6d8a319" providerId="LiveId" clId="{EC0276A3-A7F7-4812-A776-C1E1B997C97E}" dt="2020-01-06T16:25:59.529" v="453" actId="1076"/>
+          <ac:cxnSpMkLst>
+            <pc:docMk/>
+            <pc:sldMk cId="2940290616" sldId="256"/>
+            <ac:cxnSpMk id="52" creationId="{E3F06D48-075B-4BA5-8B2B-678BC3B4C7D6}"/>
+          </ac:cxnSpMkLst>
+        </pc:cxnChg>
+        <pc:cxnChg chg="add del mod">
+          <ac:chgData name="Vivian G" userId="217fb073e6d8a319" providerId="LiveId" clId="{EC0276A3-A7F7-4812-A776-C1E1B997C97E}" dt="2020-01-06T16:25:53.117" v="452" actId="1076"/>
+          <ac:cxnSpMkLst>
+            <pc:docMk/>
+            <pc:sldMk cId="2940290616" sldId="256"/>
+            <ac:cxnSpMk id="54" creationId="{BCF87AD9-8746-4B33-B0C4-682CB8A9E0E2}"/>
+          </ac:cxnSpMkLst>
+        </pc:cxnChg>
       </pc:sldChg>
     </pc:docChg>
   </pc:docChgLst>
@@ -600,7 +792,7 @@
           <a:p>
             <a:fld id="{FA8AFF0E-6EDD-44B7-94ED-3A9CE9A94E0C}" type="datetimeFigureOut">
               <a:rPr lang="fr-FR" smtClean="0"/>
-              <a:t>16/12/2019</a:t>
+              <a:t>06/01/2020</a:t>
             </a:fld>
             <a:endParaRPr lang="fr-FR"/>
           </a:p>
@@ -798,7 +990,7 @@
           <a:p>
             <a:fld id="{FA8AFF0E-6EDD-44B7-94ED-3A9CE9A94E0C}" type="datetimeFigureOut">
               <a:rPr lang="fr-FR" smtClean="0"/>
-              <a:t>16/12/2019</a:t>
+              <a:t>06/01/2020</a:t>
             </a:fld>
             <a:endParaRPr lang="fr-FR"/>
           </a:p>
@@ -1006,7 +1198,7 @@
           <a:p>
             <a:fld id="{FA8AFF0E-6EDD-44B7-94ED-3A9CE9A94E0C}" type="datetimeFigureOut">
               <a:rPr lang="fr-FR" smtClean="0"/>
-              <a:t>16/12/2019</a:t>
+              <a:t>06/01/2020</a:t>
             </a:fld>
             <a:endParaRPr lang="fr-FR"/>
           </a:p>
@@ -1204,7 +1396,7 @@
           <a:p>
             <a:fld id="{FA8AFF0E-6EDD-44B7-94ED-3A9CE9A94E0C}" type="datetimeFigureOut">
               <a:rPr lang="fr-FR" smtClean="0"/>
-              <a:t>16/12/2019</a:t>
+              <a:t>06/01/2020</a:t>
             </a:fld>
             <a:endParaRPr lang="fr-FR"/>
           </a:p>
@@ -1479,7 +1671,7 @@
           <a:p>
             <a:fld id="{FA8AFF0E-6EDD-44B7-94ED-3A9CE9A94E0C}" type="datetimeFigureOut">
               <a:rPr lang="fr-FR" smtClean="0"/>
-              <a:t>16/12/2019</a:t>
+              <a:t>06/01/2020</a:t>
             </a:fld>
             <a:endParaRPr lang="fr-FR"/>
           </a:p>
@@ -1744,7 +1936,7 @@
           <a:p>
             <a:fld id="{FA8AFF0E-6EDD-44B7-94ED-3A9CE9A94E0C}" type="datetimeFigureOut">
               <a:rPr lang="fr-FR" smtClean="0"/>
-              <a:t>16/12/2019</a:t>
+              <a:t>06/01/2020</a:t>
             </a:fld>
             <a:endParaRPr lang="fr-FR"/>
           </a:p>
@@ -2156,7 +2348,7 @@
           <a:p>
             <a:fld id="{FA8AFF0E-6EDD-44B7-94ED-3A9CE9A94E0C}" type="datetimeFigureOut">
               <a:rPr lang="fr-FR" smtClean="0"/>
-              <a:t>16/12/2019</a:t>
+              <a:t>06/01/2020</a:t>
             </a:fld>
             <a:endParaRPr lang="fr-FR"/>
           </a:p>
@@ -2297,7 +2489,7 @@
           <a:p>
             <a:fld id="{FA8AFF0E-6EDD-44B7-94ED-3A9CE9A94E0C}" type="datetimeFigureOut">
               <a:rPr lang="fr-FR" smtClean="0"/>
-              <a:t>16/12/2019</a:t>
+              <a:t>06/01/2020</a:t>
             </a:fld>
             <a:endParaRPr lang="fr-FR"/>
           </a:p>
@@ -2410,7 +2602,7 @@
           <a:p>
             <a:fld id="{FA8AFF0E-6EDD-44B7-94ED-3A9CE9A94E0C}" type="datetimeFigureOut">
               <a:rPr lang="fr-FR" smtClean="0"/>
-              <a:t>16/12/2019</a:t>
+              <a:t>06/01/2020</a:t>
             </a:fld>
             <a:endParaRPr lang="fr-FR"/>
           </a:p>
@@ -2721,7 +2913,7 @@
           <a:p>
             <a:fld id="{FA8AFF0E-6EDD-44B7-94ED-3A9CE9A94E0C}" type="datetimeFigureOut">
               <a:rPr lang="fr-FR" smtClean="0"/>
-              <a:t>16/12/2019</a:t>
+              <a:t>06/01/2020</a:t>
             </a:fld>
             <a:endParaRPr lang="fr-FR"/>
           </a:p>
@@ -3009,7 +3201,7 @@
           <a:p>
             <a:fld id="{FA8AFF0E-6EDD-44B7-94ED-3A9CE9A94E0C}" type="datetimeFigureOut">
               <a:rPr lang="fr-FR" smtClean="0"/>
-              <a:t>16/12/2019</a:t>
+              <a:t>06/01/2020</a:t>
             </a:fld>
             <a:endParaRPr lang="fr-FR"/>
           </a:p>
@@ -3250,7 +3442,7 @@
           <a:p>
             <a:fld id="{FA8AFF0E-6EDD-44B7-94ED-3A9CE9A94E0C}" type="datetimeFigureOut">
               <a:rPr lang="fr-FR" smtClean="0"/>
-              <a:t>16/12/2019</a:t>
+              <a:t>06/01/2020</a:t>
             </a:fld>
             <a:endParaRPr lang="fr-FR"/>
           </a:p>
@@ -3861,8 +4053,8 @@
         </p:nvSpPr>
         <p:spPr>
           <a:xfrm>
-            <a:off x="569140" y="3990919"/>
-            <a:ext cx="2292284" cy="340519"/>
+            <a:off x="569140" y="3871738"/>
+            <a:ext cx="2292284" cy="578882"/>
           </a:xfrm>
           <a:prstGeom prst="roundRect">
             <a:avLst/>
@@ -3883,7 +4075,7 @@
             <a:pPr algn="ctr"/>
             <a:r>
               <a:rPr lang="fr-FR" sz="1400" dirty="0"/>
-              <a:t>Editer les bulletins de salaire</a:t>
+              <a:t>Créer et valider des notes de frais</a:t>
             </a:r>
           </a:p>
         </p:txBody>
@@ -3924,7 +4116,7 @@
             <a:pPr algn="ctr"/>
             <a:r>
               <a:rPr lang="fr-FR" sz="1400" dirty="0"/>
-              <a:t>Fiches de paie</a:t>
+              <a:t>Contrôle des demandes</a:t>
             </a:r>
           </a:p>
         </p:txBody>
@@ -3943,7 +4135,7 @@
         </p:nvSpPr>
         <p:spPr>
           <a:xfrm>
-            <a:off x="9496731" y="3967190"/>
+            <a:off x="9496731" y="3745898"/>
             <a:ext cx="1751814" cy="578882"/>
           </a:xfrm>
           <a:prstGeom prst="roundRect">
@@ -3965,7 +4157,7 @@
             <a:pPr algn="ctr"/>
             <a:r>
               <a:rPr lang="fr-FR" sz="1400" dirty="0"/>
-              <a:t>Impression des fiches de paies</a:t>
+              <a:t>Validation des notes de frais</a:t>
             </a:r>
           </a:p>
         </p:txBody>
@@ -4006,7 +4198,7 @@
             <a:pPr algn="ctr"/>
             <a:r>
               <a:rPr lang="fr-FR" sz="1400" dirty="0"/>
-              <a:t>Comptable</a:t>
+              <a:t>Directeur</a:t>
             </a:r>
           </a:p>
         </p:txBody>
@@ -4129,7 +4321,7 @@
             <a:pPr algn="ctr"/>
             <a:r>
               <a:rPr lang="fr-FR" sz="1400" dirty="0"/>
-              <a:t>Donnée personnelles</a:t>
+              <a:t>Données des notes de frais</a:t>
             </a:r>
           </a:p>
         </p:txBody>
@@ -4148,7 +4340,7 @@
         </p:nvSpPr>
         <p:spPr>
           <a:xfrm>
-            <a:off x="9496731" y="2013510"/>
+            <a:off x="9484941" y="3003415"/>
             <a:ext cx="1751814" cy="578882"/>
           </a:xfrm>
           <a:prstGeom prst="roundRect">
@@ -4170,17 +4362,17 @@
             <a:pPr algn="ctr"/>
             <a:r>
               <a:rPr lang="fr-FR" sz="1400" dirty="0"/>
-              <a:t>Visualiser anciens mois</a:t>
-            </a:r>
-          </a:p>
-        </p:txBody>
-      </p:sp>
-      <p:sp>
-        <p:nvSpPr>
-          <p:cNvPr id="20" name="ZoneTexte 19">
-            <a:extLst>
-              <a:ext uri="{FF2B5EF4-FFF2-40B4-BE49-F238E27FC236}">
-                <a16:creationId xmlns:a16="http://schemas.microsoft.com/office/drawing/2014/main" id="{3B91AB16-7614-4C9E-B3B5-B93E98A5FF86}"/>
+              <a:t>Gestion / ajout notes de frais</a:t>
+            </a:r>
+          </a:p>
+        </p:txBody>
+      </p:sp>
+      <p:sp>
+        <p:nvSpPr>
+          <p:cNvPr id="21" name="ZoneTexte 20">
+            <a:extLst>
+              <a:ext uri="{FF2B5EF4-FFF2-40B4-BE49-F238E27FC236}">
+                <a16:creationId xmlns:a16="http://schemas.microsoft.com/office/drawing/2014/main" id="{10BC3F28-CABE-47CA-9D71-234893D38DF0}"/>
               </a:ext>
             </a:extLst>
           </p:cNvPr>
@@ -4189,7 +4381,7 @@
         </p:nvSpPr>
         <p:spPr>
           <a:xfrm>
-            <a:off x="9496731" y="2990350"/>
+            <a:off x="9496731" y="4714711"/>
             <a:ext cx="1751814" cy="578882"/>
           </a:xfrm>
           <a:prstGeom prst="roundRect">
@@ -4211,17 +4403,17 @@
             <a:pPr algn="ctr"/>
             <a:r>
               <a:rPr lang="fr-FR" sz="1400" dirty="0"/>
-              <a:t>Entrée donnée du mois en cours</a:t>
-            </a:r>
-          </a:p>
-        </p:txBody>
-      </p:sp>
-      <p:sp>
-        <p:nvSpPr>
-          <p:cNvPr id="21" name="ZoneTexte 20">
-            <a:extLst>
-              <a:ext uri="{FF2B5EF4-FFF2-40B4-BE49-F238E27FC236}">
-                <a16:creationId xmlns:a16="http://schemas.microsoft.com/office/drawing/2014/main" id="{10BC3F28-CABE-47CA-9D71-234893D38DF0}"/>
+              <a:t>Création des comptes salariés</a:t>
+            </a:r>
+          </a:p>
+        </p:txBody>
+      </p:sp>
+      <p:sp>
+        <p:nvSpPr>
+          <p:cNvPr id="22" name="ZoneTexte 21">
+            <a:extLst>
+              <a:ext uri="{FF2B5EF4-FFF2-40B4-BE49-F238E27FC236}">
+                <a16:creationId xmlns:a16="http://schemas.microsoft.com/office/drawing/2014/main" id="{E885E566-7C21-4B12-B384-17740978F117}"/>
               </a:ext>
             </a:extLst>
           </p:cNvPr>
@@ -4230,48 +4422,7 @@
         </p:nvSpPr>
         <p:spPr>
           <a:xfrm>
-            <a:off x="9496731" y="4944030"/>
-            <a:ext cx="1751814" cy="578882"/>
-          </a:xfrm>
-          <a:prstGeom prst="roundRect">
-            <a:avLst/>
-          </a:prstGeom>
-          <a:solidFill>
-            <a:schemeClr val="accent2">
-              <a:lumMod val="60000"/>
-              <a:lumOff val="40000"/>
-            </a:schemeClr>
-          </a:solidFill>
-        </p:spPr>
-        <p:txBody>
-          <a:bodyPr wrap="square" rtlCol="0">
-            <a:spAutoFit/>
-          </a:bodyPr>
-          <a:lstStyle/>
-          <a:p>
-            <a:pPr algn="ctr"/>
-            <a:r>
-              <a:rPr lang="fr-FR" sz="1400" dirty="0"/>
-              <a:t>Visualisation des fiches de paies</a:t>
-            </a:r>
-          </a:p>
-        </p:txBody>
-      </p:sp>
-      <p:sp>
-        <p:nvSpPr>
-          <p:cNvPr id="22" name="ZoneTexte 21">
-            <a:extLst>
-              <a:ext uri="{FF2B5EF4-FFF2-40B4-BE49-F238E27FC236}">
-                <a16:creationId xmlns:a16="http://schemas.microsoft.com/office/drawing/2014/main" id="{E885E566-7C21-4B12-B384-17740978F117}"/>
-              </a:ext>
-            </a:extLst>
-          </p:cNvPr>
-          <p:cNvSpPr txBox="1"/>
-          <p:nvPr/>
-        </p:nvSpPr>
-        <p:spPr>
-          <a:xfrm>
-            <a:off x="9210397" y="5920870"/>
+            <a:off x="9210396" y="5500540"/>
             <a:ext cx="2324481" cy="578882"/>
           </a:xfrm>
           <a:prstGeom prst="roundRect">
@@ -4312,8 +4463,8 @@
         </p:nvSpPr>
         <p:spPr>
           <a:xfrm>
-            <a:off x="6117213" y="5317111"/>
-            <a:ext cx="2562518" cy="340519"/>
+            <a:off x="6177323" y="5197929"/>
+            <a:ext cx="2562518" cy="578882"/>
           </a:xfrm>
           <a:prstGeom prst="roundRect">
             <a:avLst/>
@@ -4334,7 +4485,7 @@
             <a:pPr algn="ctr"/>
             <a:r>
               <a:rPr lang="fr-FR" sz="1400" dirty="0"/>
-              <a:t>Comptes clients</a:t>
+              <a:t>Comptes des ligues et des directeurs</a:t>
             </a:r>
           </a:p>
         </p:txBody>
@@ -4551,8 +4702,8 @@
         </p:nvCxnSpPr>
         <p:spPr>
           <a:xfrm flipV="1">
-            <a:off x="5312003" y="5487371"/>
-            <a:ext cx="805210" cy="1"/>
+            <a:off x="5312003" y="5487370"/>
+            <a:ext cx="865320" cy="2"/>
           </a:xfrm>
           <a:prstGeom prst="line">
             <a:avLst/>
@@ -4589,51 +4740,14 @@
           <p:nvPr/>
         </p:nvCxnSpPr>
         <p:spPr>
-          <a:xfrm flipV="1">
-            <a:off x="8679731" y="2302951"/>
-            <a:ext cx="817000" cy="538402"/>
+          <a:xfrm>
+            <a:off x="8679731" y="2841353"/>
+            <a:ext cx="805210" cy="451503"/>
           </a:xfrm>
           <a:prstGeom prst="bentConnector3">
-            <a:avLst/>
-          </a:prstGeom>
-        </p:spPr>
-        <p:style>
-          <a:lnRef idx="1">
-            <a:schemeClr val="accent1"/>
-          </a:lnRef>
-          <a:fillRef idx="0">
-            <a:schemeClr val="accent1"/>
-          </a:fillRef>
-          <a:effectRef idx="0">
-            <a:schemeClr val="accent1"/>
-          </a:effectRef>
-          <a:fontRef idx="minor">
-            <a:schemeClr val="tx1"/>
-          </a:fontRef>
-        </p:style>
-      </p:cxnSp>
-      <p:cxnSp>
-        <p:nvCxnSpPr>
-          <p:cNvPr id="48" name="Connecteur : en angle 47">
-            <a:extLst>
-              <a:ext uri="{FF2B5EF4-FFF2-40B4-BE49-F238E27FC236}">
-                <a16:creationId xmlns:a16="http://schemas.microsoft.com/office/drawing/2014/main" id="{2E28E69B-67AF-4B1E-8157-F14218C06D9B}"/>
-              </a:ext>
-            </a:extLst>
-          </p:cNvPr>
-          <p:cNvCxnSpPr>
-            <a:stCxn id="18" idx="3"/>
-            <a:endCxn id="20" idx="1"/>
-          </p:cNvCxnSpPr>
-          <p:nvPr/>
-        </p:nvCxnSpPr>
-        <p:spPr>
-          <a:xfrm>
-            <a:off x="8679731" y="2841353"/>
-            <a:ext cx="817000" cy="438438"/>
-          </a:xfrm>
-          <a:prstGeom prst="bentConnector3">
-            <a:avLst/>
+            <a:avLst>
+              <a:gd name="adj1" fmla="val 52205"/>
+            </a:avLst>
           </a:prstGeom>
         </p:spPr>
         <p:style>
@@ -4667,9 +4781,9 @@
           <p:nvPr/>
         </p:nvCxnSpPr>
         <p:spPr>
-          <a:xfrm>
-            <a:off x="8679731" y="4161179"/>
-            <a:ext cx="817000" cy="95452"/>
+          <a:xfrm flipV="1">
+            <a:off x="8679731" y="4035339"/>
+            <a:ext cx="817000" cy="125840"/>
           </a:xfrm>
           <a:prstGeom prst="bentConnector3">
             <a:avLst/>
@@ -4708,7 +4822,7 @@
         <p:spPr>
           <a:xfrm>
             <a:off x="8679731" y="4161179"/>
-            <a:ext cx="817000" cy="1072292"/>
+            <a:ext cx="817000" cy="842973"/>
           </a:xfrm>
           <a:prstGeom prst="bentConnector3">
             <a:avLst/>
@@ -4739,6 +4853,7 @@
             </a:extLst>
           </p:cNvPr>
           <p:cNvCxnSpPr>
+            <a:cxnSpLocks/>
             <a:stCxn id="23" idx="3"/>
             <a:endCxn id="22" idx="1"/>
           </p:cNvCxnSpPr>
@@ -4746,8 +4861,8 @@
         </p:nvCxnSpPr>
         <p:spPr>
           <a:xfrm>
-            <a:off x="8679731" y="5487371"/>
-            <a:ext cx="530666" cy="722940"/>
+            <a:off x="8739841" y="5487370"/>
+            <a:ext cx="470555" cy="302611"/>
           </a:xfrm>
           <a:prstGeom prst="bentConnector3">
             <a:avLst/>
@@ -4768,6 +4883,86 @@
           </a:fontRef>
         </p:style>
       </p:cxnSp>
+      <p:cxnSp>
+        <p:nvCxnSpPr>
+          <p:cNvPr id="31" name="Connecteur : en angle 30">
+            <a:extLst>
+              <a:ext uri="{FF2B5EF4-FFF2-40B4-BE49-F238E27FC236}">
+                <a16:creationId xmlns:a16="http://schemas.microsoft.com/office/drawing/2014/main" id="{4AF9F0DE-AB09-485D-B176-3EABE0C0E908}"/>
+              </a:ext>
+            </a:extLst>
+          </p:cNvPr>
+          <p:cNvCxnSpPr>
+            <a:cxnSpLocks/>
+            <a:endCxn id="33" idx="1"/>
+          </p:cNvCxnSpPr>
+          <p:nvPr/>
+        </p:nvCxnSpPr>
+        <p:spPr>
+          <a:xfrm flipV="1">
+            <a:off x="8679730" y="2487319"/>
+            <a:ext cx="823574" cy="346658"/>
+          </a:xfrm>
+          <a:prstGeom prst="bentConnector3">
+            <a:avLst/>
+          </a:prstGeom>
+        </p:spPr>
+        <p:style>
+          <a:lnRef idx="1">
+            <a:schemeClr val="accent1"/>
+          </a:lnRef>
+          <a:fillRef idx="0">
+            <a:schemeClr val="accent1"/>
+          </a:fillRef>
+          <a:effectRef idx="0">
+            <a:schemeClr val="accent1"/>
+          </a:effectRef>
+          <a:fontRef idx="minor">
+            <a:schemeClr val="tx1"/>
+          </a:fontRef>
+        </p:style>
+      </p:cxnSp>
+      <p:sp>
+        <p:nvSpPr>
+          <p:cNvPr id="33" name="ZoneTexte 32">
+            <a:extLst>
+              <a:ext uri="{FF2B5EF4-FFF2-40B4-BE49-F238E27FC236}">
+                <a16:creationId xmlns:a16="http://schemas.microsoft.com/office/drawing/2014/main" id="{E5429D25-665E-48EC-9029-80AA2AB18619}"/>
+              </a:ext>
+            </a:extLst>
+          </p:cNvPr>
+          <p:cNvSpPr txBox="1"/>
+          <p:nvPr/>
+        </p:nvSpPr>
+        <p:spPr>
+          <a:xfrm>
+            <a:off x="9503304" y="2317059"/>
+            <a:ext cx="1751814" cy="340519"/>
+          </a:xfrm>
+          <a:prstGeom prst="roundRect">
+            <a:avLst/>
+          </a:prstGeom>
+          <a:solidFill>
+            <a:schemeClr val="accent2">
+              <a:lumMod val="60000"/>
+              <a:lumOff val="40000"/>
+            </a:schemeClr>
+          </a:solidFill>
+        </p:spPr>
+        <p:txBody>
+          <a:bodyPr wrap="square" rtlCol="0">
+            <a:spAutoFit/>
+          </a:bodyPr>
+          <a:lstStyle/>
+          <a:p>
+            <a:pPr algn="ctr"/>
+            <a:r>
+              <a:rPr lang="fr-FR" sz="1400" dirty="0"/>
+              <a:t>Gestion profil</a:t>
+            </a:r>
+          </a:p>
+        </p:txBody>
+      </p:sp>
     </p:spTree>
     <p:extLst>
       <p:ext uri="{BB962C8B-B14F-4D97-AF65-F5344CB8AC3E}">

</xml_diff>